<commit_message>
Proceso de Gestión de Cambios a Requerimientos Versión 0.1 - 11/06/2015
</commit_message>
<xml_diff>
--- a/CMMI-Nivel-2/REQM/PGCREQM_0.1_2015.pptx
+++ b/CMMI-Nivel-2/REQM/PGCREQM_0.1_2015.pptx
@@ -144,10 +144,10 @@
       </p14:sectionLst>
     </p:ext>
     <p:ext uri="{EFAFB233-063F-42B5-8137-9DF3F51BA10A}">
-      <p15:sldGuideLst xmlns:p15="http://schemas.microsoft.com/office/powerpoint/2012/main" xmlns=""/>
+      <p15:sldGuideLst xmlns="" xmlns:p15="http://schemas.microsoft.com/office/powerpoint/2012/main"/>
     </p:ext>
     <p:ext uri="{2D200454-40CA-4A62-9FC3-DE9A4176ACB9}">
-      <p15:notesGuideLst xmlns:p15="http://schemas.microsoft.com/office/powerpoint/2012/main" xmlns=""/>
+      <p15:notesGuideLst xmlns="" xmlns:p15="http://schemas.microsoft.com/office/powerpoint/2012/main"/>
     </p:ext>
   </p:extLst>
 </p:presentation>
@@ -12580,7 +12580,7 @@
           <p:nvPr>
             <p:extLst>
               <p:ext uri="{D42A27DB-BD31-4B8C-83A1-F6EECF244321}">
-                <p14:modId xmlns:p14="http://schemas.microsoft.com/office/powerpoint/2010/main" val="561010193"/>
+                <p14:modId xmlns:p14="http://schemas.microsoft.com/office/powerpoint/2010/main" val="1324483316"/>
               </p:ext>
             </p:extLst>
           </p:nvPr>
@@ -12851,7 +12851,7 @@
                           <a:latin typeface="Arial" pitchFamily="34" charset="0"/>
                           <a:cs typeface="Arial" pitchFamily="34" charset="0"/>
                         </a:rPr>
-                        <a:t>Revisado</a:t>
+                        <a:t>En Revisión</a:t>
                       </a:r>
                       <a:endParaRPr lang="es-PE" sz="1300" dirty="0">
                         <a:latin typeface="Arial" pitchFamily="34" charset="0"/>
@@ -18823,7 +18823,7 @@
   <a:extraClrSchemeLst/>
   <a:extLst>
     <a:ext uri="{05A4C25C-085E-4340-85A3-A5531E510DB2}">
-      <thm15:themeFamily xmlns:thm15="http://schemas.microsoft.com/office/thememl/2012/main" xmlns="" name="Berlin" id="{7B5DBA9E-B069-418E-9360-A61BDD0615A4}" vid="{B587E4A9-1405-4B4F-8BC3-512EE08D2EBF}"/>
+      <thm15:themeFamily xmlns="" xmlns:thm15="http://schemas.microsoft.com/office/thememl/2012/main" name="Berlin" id="{7B5DBA9E-B069-418E-9360-A61BDD0615A4}" vid="{B587E4A9-1405-4B4F-8BC3-512EE08D2EBF}"/>
     </a:ext>
   </a:extLst>
 </a:theme>
@@ -19084,7 +19084,7 @@
   <a:extraClrSchemeLst/>
   <a:extLst>
     <a:ext uri="{05A4C25C-085E-4340-85A3-A5531E510DB2}">
-      <thm15:themeFamily xmlns:thm15="http://schemas.microsoft.com/office/thememl/2012/main" xmlns="" name="Office Theme" id="{62F939B6-93AF-4DB8-9C6B-D6C7DFDC589F}" vid="{4A3C46E8-61CC-4603-A589-7422A47A8E4A}"/>
+      <thm15:themeFamily xmlns="" xmlns:thm15="http://schemas.microsoft.com/office/thememl/2012/main" name="Office Theme" id="{62F939B6-93AF-4DB8-9C6B-D6C7DFDC589F}" vid="{4A3C46E8-61CC-4603-A589-7422A47A8E4A}"/>
     </a:ext>
   </a:extLst>
 </a:theme>

</xml_diff>

<commit_message>
Proceso d Gestión de Cambios a Requerimentos Versión 0.1 - 25/06/2015
</commit_message>
<xml_diff>
--- a/CMMI-Nivel-2/REQM/PGCREQM_0.1_2015.pptx
+++ b/CMMI-Nivel-2/REQM/PGCREQM_0.1_2015.pptx
@@ -144,10 +144,10 @@
       </p14:sectionLst>
     </p:ext>
     <p:ext uri="{EFAFB233-063F-42B5-8137-9DF3F51BA10A}">
-      <p15:sldGuideLst xmlns="" xmlns:p15="http://schemas.microsoft.com/office/powerpoint/2012/main"/>
+      <p15:sldGuideLst xmlns:p15="http://schemas.microsoft.com/office/powerpoint/2012/main" xmlns=""/>
     </p:ext>
     <p:ext uri="{2D200454-40CA-4A62-9FC3-DE9A4176ACB9}">
-      <p15:notesGuideLst xmlns="" xmlns:p15="http://schemas.microsoft.com/office/powerpoint/2012/main"/>
+      <p15:notesGuideLst xmlns:p15="http://schemas.microsoft.com/office/powerpoint/2012/main" xmlns=""/>
     </p:ext>
   </p:extLst>
 </p:presentation>
@@ -235,7 +235,7 @@
           <a:p>
             <a:fld id="{E3775AAE-0936-40B9-ACF9-A981EEF95D23}" type="datetimeFigureOut">
               <a:rPr lang="en-US" smtClean="0"/>
-              <a:t>6/11/2015</a:t>
+              <a:t>6/25/2015</a:t>
             </a:fld>
             <a:endParaRPr lang="en-US"/>
           </a:p>
@@ -1980,7 +1980,7 @@
           <a:p>
             <a:fld id="{78ABE3C1-DBE1-495D-B57B-2849774B866A}" type="datetimeFigureOut">
               <a:rPr lang="en-US" smtClean="0"/>
-              <a:t>6/11/2015</a:t>
+              <a:t>6/25/2015</a:t>
             </a:fld>
             <a:endParaRPr lang="en-US" dirty="0"/>
           </a:p>
@@ -2406,7 +2406,7 @@
           <a:p>
             <a:fld id="{446C117F-5CCF-4837-BE5F-2B92066CAFAF}" type="datetimeFigureOut">
               <a:rPr lang="en-US" smtClean="0"/>
-              <a:t>6/11/2015</a:t>
+              <a:t>6/25/2015</a:t>
             </a:fld>
             <a:endParaRPr lang="en-US" dirty="0"/>
           </a:p>
@@ -2754,7 +2754,7 @@
           <a:p>
             <a:fld id="{84EB90BD-B6CE-46B7-997F-7313B992CCDC}" type="datetimeFigureOut">
               <a:rPr lang="en-US" smtClean="0"/>
-              <a:t>6/11/2015</a:t>
+              <a:t>6/25/2015</a:t>
             </a:fld>
             <a:endParaRPr lang="en-US" dirty="0"/>
           </a:p>
@@ -3171,7 +3171,7 @@
           <a:p>
             <a:fld id="{CDB9D11F-B188-461D-B23F-39381795C052}" type="datetimeFigureOut">
               <a:rPr lang="en-US" smtClean="0"/>
-              <a:t>6/11/2015</a:t>
+              <a:t>6/25/2015</a:t>
             </a:fld>
             <a:endParaRPr lang="en-US" dirty="0"/>
           </a:p>
@@ -3751,7 +3751,7 @@
           <a:p>
             <a:fld id="{52E6D8D9-55A2-4063-B0F3-121F44549695}" type="datetimeFigureOut">
               <a:rPr lang="en-US" smtClean="0"/>
-              <a:t>6/11/2015</a:t>
+              <a:t>6/25/2015</a:t>
             </a:fld>
             <a:endParaRPr lang="en-US" dirty="0"/>
           </a:p>
@@ -4444,7 +4444,7 @@
           <a:p>
             <a:fld id="{D4B24536-994D-4021-A283-9F449C0DB509}" type="datetimeFigureOut">
               <a:rPr lang="en-US" smtClean="0"/>
-              <a:t>6/11/2015</a:t>
+              <a:t>6/25/2015</a:t>
             </a:fld>
             <a:endParaRPr lang="en-US" dirty="0"/>
           </a:p>
@@ -5369,7 +5369,7 @@
           <a:p>
             <a:fld id="{3CBBBB78-C96F-47B7-AB17-D852CA960AC9}" type="datetimeFigureOut">
               <a:rPr lang="en-US" smtClean="0"/>
-              <a:t>6/11/2015</a:t>
+              <a:t>6/25/2015</a:t>
             </a:fld>
             <a:endParaRPr lang="en-US" dirty="0"/>
           </a:p>
@@ -5694,7 +5694,7 @@
           <a:p>
             <a:fld id="{1FA3F48C-C7C6-4055-9F49-3777875E72AE}" type="datetimeFigureOut">
               <a:rPr lang="en-US" smtClean="0"/>
-              <a:t>6/11/2015</a:t>
+              <a:t>6/25/2015</a:t>
             </a:fld>
             <a:endParaRPr lang="en-US" dirty="0"/>
           </a:p>
@@ -5970,7 +5970,7 @@
           <a:p>
             <a:fld id="{6178E61D-D431-422C-9764-11DAFE33AB63}" type="datetimeFigureOut">
               <a:rPr lang="en-US" smtClean="0"/>
-              <a:t>6/11/2015</a:t>
+              <a:t>6/25/2015</a:t>
             </a:fld>
             <a:endParaRPr lang="en-US" dirty="0"/>
           </a:p>
@@ -6324,7 +6324,7 @@
           <a:p>
             <a:fld id="{12DE42F4-6EEF-4EF7-8ED4-2208F0F89A08}" type="datetimeFigureOut">
               <a:rPr lang="en-US" smtClean="0"/>
-              <a:t>6/11/2015</a:t>
+              <a:t>6/25/2015</a:t>
             </a:fld>
             <a:endParaRPr lang="en-US" dirty="0"/>
           </a:p>
@@ -6725,7 +6725,7 @@
           <a:p>
             <a:fld id="{30578ACC-22D6-47C1-A373-4FD133E34F3C}" type="datetimeFigureOut">
               <a:rPr lang="en-US" smtClean="0"/>
-              <a:t>6/11/2015</a:t>
+              <a:t>6/25/2015</a:t>
             </a:fld>
             <a:endParaRPr lang="en-US" dirty="0"/>
           </a:p>
@@ -7113,7 +7113,7 @@
           <a:p>
             <a:fld id="{4E5A6C69-6797-4E8A-BF37-F2C3751466E9}" type="datetimeFigureOut">
               <a:rPr lang="en-US" smtClean="0"/>
-              <a:t>6/11/2015</a:t>
+              <a:t>6/25/2015</a:t>
             </a:fld>
             <a:endParaRPr lang="en-US" dirty="0"/>
           </a:p>
@@ -7631,7 +7631,7 @@
           <a:p>
             <a:fld id="{D82014A1-A632-4878-A0D3-F52BA7563730}" type="datetimeFigureOut">
               <a:rPr lang="en-US" smtClean="0"/>
-              <a:t>6/11/2015</a:t>
+              <a:t>6/25/2015</a:t>
             </a:fld>
             <a:endParaRPr lang="en-US" dirty="0"/>
           </a:p>
@@ -7900,7 +7900,7 @@
           <a:p>
             <a:fld id="{CE99F462-093F-4566-844B-4C71F2739DA5}" type="datetimeFigureOut">
               <a:rPr lang="en-US" smtClean="0"/>
-              <a:t>6/11/2015</a:t>
+              <a:t>6/25/2015</a:t>
             </a:fld>
             <a:endParaRPr lang="en-US" dirty="0"/>
           </a:p>
@@ -8075,7 +8075,7 @@
           <a:p>
             <a:fld id="{3D24A7AC-904D-4781-85BA-7D10C17ED021}" type="datetimeFigureOut">
               <a:rPr lang="en-US" smtClean="0"/>
-              <a:t>6/11/2015</a:t>
+              <a:t>6/25/2015</a:t>
             </a:fld>
             <a:endParaRPr lang="en-US" dirty="0"/>
           </a:p>
@@ -8477,7 +8477,7 @@
           <a:p>
             <a:fld id="{E331444B-B92B-4E27-8C94-BB93EAF5CB18}" type="datetimeFigureOut">
               <a:rPr lang="en-US" smtClean="0"/>
-              <a:t>6/11/2015</a:t>
+              <a:t>6/25/2015</a:t>
             </a:fld>
             <a:endParaRPr lang="en-US" dirty="0"/>
           </a:p>
@@ -8898,7 +8898,7 @@
           <a:p>
             <a:fld id="{363EFA5E-FA76-400D-B3DC-F0BA90E6D107}" type="datetimeFigureOut">
               <a:rPr lang="en-US" smtClean="0"/>
-              <a:t>6/11/2015</a:t>
+              <a:t>6/25/2015</a:t>
             </a:fld>
             <a:endParaRPr lang="en-US" dirty="0"/>
           </a:p>
@@ -9154,7 +9154,7 @@
           <a:p>
             <a:fld id="{9D6E9DEC-419B-4CC5-A080-3B06BD5A8291}" type="datetimeFigureOut">
               <a:rPr lang="en-US" smtClean="0"/>
-              <a:t>6/11/2015</a:t>
+              <a:t>6/25/2015</a:t>
             </a:fld>
             <a:endParaRPr lang="en-US" dirty="0"/>
           </a:p>
@@ -9679,65 +9679,6 @@
               <a:t>Requerimientos</a:t>
             </a:r>
             <a:endParaRPr lang="en-US" sz="4500" dirty="0">
-              <a:latin typeface="Arial" pitchFamily="34" charset="0"/>
-              <a:cs typeface="Arial" pitchFamily="34" charset="0"/>
-            </a:endParaRPr>
-          </a:p>
-        </p:txBody>
-      </p:sp>
-      <p:sp>
-        <p:nvSpPr>
-          <p:cNvPr id="3" name="Subtitle 2"/>
-          <p:cNvSpPr>
-            <a:spLocks noGrp="1"/>
-          </p:cNvSpPr>
-          <p:nvPr>
-            <p:ph type="subTitle" idx="1"/>
-          </p:nvPr>
-        </p:nvSpPr>
-        <p:spPr/>
-        <p:txBody>
-          <a:bodyPr>
-            <a:normAutofit/>
-          </a:bodyPr>
-          <a:lstStyle/>
-          <a:p>
-            <a:r>
-              <a:rPr lang="en-US" sz="2500" dirty="0" err="1" smtClean="0">
-                <a:latin typeface="Arial" pitchFamily="34" charset="0"/>
-                <a:cs typeface="Arial" pitchFamily="34" charset="0"/>
-              </a:rPr>
-              <a:t>Proceso</a:t>
-            </a:r>
-            <a:r>
-              <a:rPr lang="en-US" sz="2500" dirty="0" smtClean="0">
-                <a:latin typeface="Arial" pitchFamily="34" charset="0"/>
-                <a:cs typeface="Arial" pitchFamily="34" charset="0"/>
-              </a:rPr>
-              <a:t> de </a:t>
-            </a:r>
-            <a:r>
-              <a:rPr lang="en-US" sz="2500" dirty="0" err="1" smtClean="0">
-                <a:latin typeface="Arial" pitchFamily="34" charset="0"/>
-                <a:cs typeface="Arial" pitchFamily="34" charset="0"/>
-              </a:rPr>
-              <a:t>Gestión</a:t>
-            </a:r>
-            <a:r>
-              <a:rPr lang="en-US" sz="2500" dirty="0" smtClean="0">
-                <a:latin typeface="Arial" pitchFamily="34" charset="0"/>
-                <a:cs typeface="Arial" pitchFamily="34" charset="0"/>
-              </a:rPr>
-              <a:t> de </a:t>
-            </a:r>
-            <a:r>
-              <a:rPr lang="en-US" sz="2500" dirty="0" err="1" smtClean="0">
-                <a:latin typeface="Arial" pitchFamily="34" charset="0"/>
-                <a:cs typeface="Arial" pitchFamily="34" charset="0"/>
-              </a:rPr>
-              <a:t>Proyecto</a:t>
-            </a:r>
-            <a:endParaRPr lang="en-US" sz="2500" dirty="0">
               <a:latin typeface="Arial" pitchFamily="34" charset="0"/>
               <a:cs typeface="Arial" pitchFamily="34" charset="0"/>
             </a:endParaRPr>
@@ -12580,7 +12521,7 @@
           <p:nvPr>
             <p:extLst>
               <p:ext uri="{D42A27DB-BD31-4B8C-83A1-F6EECF244321}">
-                <p14:modId xmlns:p14="http://schemas.microsoft.com/office/powerpoint/2010/main" val="1324483316"/>
+                <p14:modId xmlns:p14="http://schemas.microsoft.com/office/powerpoint/2010/main" val="2171307141"/>
               </p:ext>
             </p:extLst>
           </p:nvPr>
@@ -12872,8 +12813,19 @@
                           <a:latin typeface="Arial" pitchFamily="34" charset="0"/>
                           <a:cs typeface="Arial" pitchFamily="34" charset="0"/>
                         </a:rPr>
-                        <a:t>Kevin Laureano</a:t>
+                        <a:t>Manuel </a:t>
                       </a:r>
+                      <a:r>
+                        <a:rPr lang="es-PE" sz="1300" dirty="0" err="1" smtClean="0">
+                          <a:latin typeface="Arial" pitchFamily="34" charset="0"/>
+                          <a:cs typeface="Arial" pitchFamily="34" charset="0"/>
+                        </a:rPr>
+                        <a:t>Saenz</a:t>
+                      </a:r>
+                      <a:endParaRPr lang="es-PE" sz="1300" dirty="0" smtClean="0">
+                        <a:latin typeface="Arial" pitchFamily="34" charset="0"/>
+                        <a:cs typeface="Arial" pitchFamily="34" charset="0"/>
+                      </a:endParaRPr>
                     </a:p>
                     <a:p>
                       <a:pPr algn="ctr"/>
@@ -12882,7 +12834,7 @@
                           <a:latin typeface="Arial" pitchFamily="34" charset="0"/>
                           <a:cs typeface="Arial" pitchFamily="34" charset="0"/>
                         </a:rPr>
-                        <a:t>(Analista de Calidad)</a:t>
+                        <a:t>(Cliente)</a:t>
                       </a:r>
                       <a:endParaRPr lang="es-PE" sz="1300" dirty="0">
                         <a:latin typeface="Arial" pitchFamily="34" charset="0"/>
@@ -14908,7 +14860,7 @@
                 <a:latin typeface="Arial" pitchFamily="34" charset="0"/>
                 <a:cs typeface="Arial" pitchFamily="34" charset="0"/>
               </a:rPr>
-              <a:t>(Usuario final)</a:t>
+              <a:t>(Cliente)</a:t>
             </a:r>
             <a:endParaRPr lang="es-PE" sz="1100" b="1" dirty="0">
               <a:solidFill>
@@ -15021,8 +14973,8 @@
         </p:nvSpPr>
         <p:spPr>
           <a:xfrm>
-            <a:off x="434651" y="4554031"/>
-            <a:ext cx="1714500" cy="1082893"/>
+            <a:off x="434651" y="4506630"/>
+            <a:ext cx="1714500" cy="1177696"/>
           </a:xfrm>
           <a:prstGeom prst="homePlate">
             <a:avLst/>
@@ -15078,7 +15030,7 @@
                 <a:latin typeface="Arial" pitchFamily="34" charset="0"/>
                 <a:cs typeface="Arial" pitchFamily="34" charset="0"/>
               </a:rPr>
-              <a:t>(Usuario líder)</a:t>
+              <a:t>(Líder de Proyecto)</a:t>
             </a:r>
             <a:endParaRPr lang="es-PE" sz="1100" b="1" dirty="0">
               <a:solidFill>
@@ -18823,7 +18775,7 @@
   <a:extraClrSchemeLst/>
   <a:extLst>
     <a:ext uri="{05A4C25C-085E-4340-85A3-A5531E510DB2}">
-      <thm15:themeFamily xmlns="" xmlns:thm15="http://schemas.microsoft.com/office/thememl/2012/main" name="Berlin" id="{7B5DBA9E-B069-418E-9360-A61BDD0615A4}" vid="{B587E4A9-1405-4B4F-8BC3-512EE08D2EBF}"/>
+      <thm15:themeFamily xmlns:thm15="http://schemas.microsoft.com/office/thememl/2012/main" xmlns="" name="Berlin" id="{7B5DBA9E-B069-418E-9360-A61BDD0615A4}" vid="{B587E4A9-1405-4B4F-8BC3-512EE08D2EBF}"/>
     </a:ext>
   </a:extLst>
 </a:theme>
@@ -19084,7 +19036,7 @@
   <a:extraClrSchemeLst/>
   <a:extLst>
     <a:ext uri="{05A4C25C-085E-4340-85A3-A5531E510DB2}">
-      <thm15:themeFamily xmlns="" xmlns:thm15="http://schemas.microsoft.com/office/thememl/2012/main" name="Office Theme" id="{62F939B6-93AF-4DB8-9C6B-D6C7DFDC589F}" vid="{4A3C46E8-61CC-4603-A589-7422A47A8E4A}"/>
+      <thm15:themeFamily xmlns:thm15="http://schemas.microsoft.com/office/thememl/2012/main" xmlns="" name="Office Theme" id="{62F939B6-93AF-4DB8-9C6B-D6C7DFDC589F}" vid="{4A3C46E8-61CC-4603-A589-7422A47A8E4A}"/>
     </a:ext>
   </a:extLst>
 </a:theme>

</xml_diff>